<commit_message>
Update slides with Sysmon attack detection slides, add declaration of AI
</commit_message>
<xml_diff>
--- a/Week 9/Week9.pptx
+++ b/Week 9/Week9.pptx
@@ -4244,8 +4244,8 @@
         </p:nvSpPr>
         <p:spPr>
           <a:xfrm>
-            <a:off x="4162567" y="818984"/>
-            <a:ext cx="6714699" cy="3178689"/>
+            <a:off x="4175267" y="2971800"/>
+            <a:ext cx="6714699" cy="985434"/>
           </a:xfrm>
         </p:spPr>
         <p:txBody>

</xml_diff>